<commit_message>
replicated background in all slides
</commit_message>
<xml_diff>
--- a/presentation.pptx
+++ b/presentation.pptx
@@ -3181,6 +3181,30 @@
         <p:nvPr/>
       </p:nvGrpSpPr>
       <p:grpSpPr/>
+      <p:pic>
+        <p:nvPicPr>
+          <p:cNvPr id="4" name="Picture 3" descr="bg.jpg"/>
+          <p:cNvPicPr>
+            <a:picLocks noChangeAspect="1"/>
+          </p:cNvPicPr>
+          <p:nvPr/>
+        </p:nvPicPr>
+        <p:blipFill>
+          <a:blip r:embed="rId2"/>
+          <a:stretch>
+            <a:fillRect/>
+          </a:stretch>
+        </p:blipFill>
+        <p:spPr>
+          <a:xfrm>
+            <a:off x="0" y="0"/>
+            <a:ext cx="9144000" cy="6858000"/>
+          </a:xfrm>
+          <a:prstGeom prst="rect">
+            <a:avLst/>
+          </a:prstGeom>
+        </p:spPr>
+      </p:pic>
       <p:sp>
         <p:nvSpPr>
           <p:cNvPr id="2" name="Title 1"/>
@@ -3241,6 +3265,30 @@
         <p:nvPr/>
       </p:nvGrpSpPr>
       <p:grpSpPr/>
+      <p:pic>
+        <p:nvPicPr>
+          <p:cNvPr id="4" name="Picture 3" descr="bg.jpg"/>
+          <p:cNvPicPr>
+            <a:picLocks noChangeAspect="1"/>
+          </p:cNvPicPr>
+          <p:nvPr/>
+        </p:nvPicPr>
+        <p:blipFill>
+          <a:blip r:embed="rId2"/>
+          <a:stretch>
+            <a:fillRect/>
+          </a:stretch>
+        </p:blipFill>
+        <p:spPr>
+          <a:xfrm>
+            <a:off x="0" y="0"/>
+            <a:ext cx="9144000" cy="6858000"/>
+          </a:xfrm>
+          <a:prstGeom prst="rect">
+            <a:avLst/>
+          </a:prstGeom>
+        </p:spPr>
+      </p:pic>
       <p:sp>
         <p:nvSpPr>
           <p:cNvPr id="2" name="Title 1"/>
@@ -3319,6 +3367,30 @@
         <p:nvPr/>
       </p:nvGrpSpPr>
       <p:grpSpPr/>
+      <p:pic>
+        <p:nvPicPr>
+          <p:cNvPr id="4" name="Picture 3" descr="bg.jpg"/>
+          <p:cNvPicPr>
+            <a:picLocks noChangeAspect="1"/>
+          </p:cNvPicPr>
+          <p:nvPr/>
+        </p:nvPicPr>
+        <p:blipFill>
+          <a:blip r:embed="rId2"/>
+          <a:stretch>
+            <a:fillRect/>
+          </a:stretch>
+        </p:blipFill>
+        <p:spPr>
+          <a:xfrm>
+            <a:off x="0" y="0"/>
+            <a:ext cx="9144000" cy="6858000"/>
+          </a:xfrm>
+          <a:prstGeom prst="rect">
+            <a:avLst/>
+          </a:prstGeom>
+        </p:spPr>
+      </p:pic>
       <p:sp>
         <p:nvSpPr>
           <p:cNvPr id="2" name="Title 1"/>
@@ -3397,6 +3469,30 @@
         <p:nvPr/>
       </p:nvGrpSpPr>
       <p:grpSpPr/>
+      <p:pic>
+        <p:nvPicPr>
+          <p:cNvPr id="4" name="Picture 3" descr="bg.jpg"/>
+          <p:cNvPicPr>
+            <a:picLocks noChangeAspect="1"/>
+          </p:cNvPicPr>
+          <p:nvPr/>
+        </p:nvPicPr>
+        <p:blipFill>
+          <a:blip r:embed="rId2"/>
+          <a:stretch>
+            <a:fillRect/>
+          </a:stretch>
+        </p:blipFill>
+        <p:spPr>
+          <a:xfrm>
+            <a:off x="0" y="0"/>
+            <a:ext cx="9144000" cy="6858000"/>
+          </a:xfrm>
+          <a:prstGeom prst="rect">
+            <a:avLst/>
+          </a:prstGeom>
+        </p:spPr>
+      </p:pic>
       <p:sp>
         <p:nvSpPr>
           <p:cNvPr id="2" name="Title 1"/>
@@ -3475,6 +3571,30 @@
         <p:nvPr/>
       </p:nvGrpSpPr>
       <p:grpSpPr/>
+      <p:pic>
+        <p:nvPicPr>
+          <p:cNvPr id="4" name="Picture 3" descr="bg.jpg"/>
+          <p:cNvPicPr>
+            <a:picLocks noChangeAspect="1"/>
+          </p:cNvPicPr>
+          <p:nvPr/>
+        </p:nvPicPr>
+        <p:blipFill>
+          <a:blip r:embed="rId2"/>
+          <a:stretch>
+            <a:fillRect/>
+          </a:stretch>
+        </p:blipFill>
+        <p:spPr>
+          <a:xfrm>
+            <a:off x="0" y="0"/>
+            <a:ext cx="9144000" cy="6858000"/>
+          </a:xfrm>
+          <a:prstGeom prst="rect">
+            <a:avLst/>
+          </a:prstGeom>
+        </p:spPr>
+      </p:pic>
       <p:sp>
         <p:nvSpPr>
           <p:cNvPr id="2" name="Title 1"/>
@@ -3553,6 +3673,30 @@
         <p:nvPr/>
       </p:nvGrpSpPr>
       <p:grpSpPr/>
+      <p:pic>
+        <p:nvPicPr>
+          <p:cNvPr id="4" name="Picture 3" descr="bg.jpg"/>
+          <p:cNvPicPr>
+            <a:picLocks noChangeAspect="1"/>
+          </p:cNvPicPr>
+          <p:nvPr/>
+        </p:nvPicPr>
+        <p:blipFill>
+          <a:blip r:embed="rId2"/>
+          <a:stretch>
+            <a:fillRect/>
+          </a:stretch>
+        </p:blipFill>
+        <p:spPr>
+          <a:xfrm>
+            <a:off x="0" y="0"/>
+            <a:ext cx="9144000" cy="6858000"/>
+          </a:xfrm>
+          <a:prstGeom prst="rect">
+            <a:avLst/>
+          </a:prstGeom>
+        </p:spPr>
+      </p:pic>
       <p:sp>
         <p:nvSpPr>
           <p:cNvPr id="2" name="Title 1"/>
@@ -3631,6 +3775,30 @@
         <p:nvPr/>
       </p:nvGrpSpPr>
       <p:grpSpPr/>
+      <p:pic>
+        <p:nvPicPr>
+          <p:cNvPr id="4" name="Picture 3" descr="bg.jpg"/>
+          <p:cNvPicPr>
+            <a:picLocks noChangeAspect="1"/>
+          </p:cNvPicPr>
+          <p:nvPr/>
+        </p:nvPicPr>
+        <p:blipFill>
+          <a:blip r:embed="rId2"/>
+          <a:stretch>
+            <a:fillRect/>
+          </a:stretch>
+        </p:blipFill>
+        <p:spPr>
+          <a:xfrm>
+            <a:off x="0" y="0"/>
+            <a:ext cx="9144000" cy="6858000"/>
+          </a:xfrm>
+          <a:prstGeom prst="rect">
+            <a:avLst/>
+          </a:prstGeom>
+        </p:spPr>
+      </p:pic>
       <p:sp>
         <p:nvSpPr>
           <p:cNvPr id="2" name="Title 1"/>
@@ -3709,6 +3877,30 @@
         <p:nvPr/>
       </p:nvGrpSpPr>
       <p:grpSpPr/>
+      <p:pic>
+        <p:nvPicPr>
+          <p:cNvPr id="4" name="Picture 3" descr="bg.jpg"/>
+          <p:cNvPicPr>
+            <a:picLocks noChangeAspect="1"/>
+          </p:cNvPicPr>
+          <p:nvPr/>
+        </p:nvPicPr>
+        <p:blipFill>
+          <a:blip r:embed="rId2"/>
+          <a:stretch>
+            <a:fillRect/>
+          </a:stretch>
+        </p:blipFill>
+        <p:spPr>
+          <a:xfrm>
+            <a:off x="0" y="0"/>
+            <a:ext cx="9144000" cy="6858000"/>
+          </a:xfrm>
+          <a:prstGeom prst="rect">
+            <a:avLst/>
+          </a:prstGeom>
+        </p:spPr>
+      </p:pic>
       <p:sp>
         <p:nvSpPr>
           <p:cNvPr id="2" name="Title 1"/>
@@ -3769,6 +3961,30 @@
         <p:nvPr/>
       </p:nvGrpSpPr>
       <p:grpSpPr/>
+      <p:pic>
+        <p:nvPicPr>
+          <p:cNvPr id="4" name="Picture 3" descr="bg.jpg"/>
+          <p:cNvPicPr>
+            <a:picLocks noChangeAspect="1"/>
+          </p:cNvPicPr>
+          <p:nvPr/>
+        </p:nvPicPr>
+        <p:blipFill>
+          <a:blip r:embed="rId2"/>
+          <a:stretch>
+            <a:fillRect/>
+          </a:stretch>
+        </p:blipFill>
+        <p:spPr>
+          <a:xfrm>
+            <a:off x="0" y="0"/>
+            <a:ext cx="9144000" cy="6858000"/>
+          </a:xfrm>
+          <a:prstGeom prst="rect">
+            <a:avLst/>
+          </a:prstGeom>
+        </p:spPr>
+      </p:pic>
       <p:sp>
         <p:nvSpPr>
           <p:cNvPr id="2" name="Title 1"/>

</xml_diff>